<commit_message>
Add David's drone slides
</commit_message>
<xml_diff>
--- a/Documents/designReview_revised.pptx
+++ b/Documents/designReview_revised.pptx
@@ -119,6 +119,27 @@
     </a:lvl9pPr>
   </p:defaultTextStyle>
   <p:extLst>
+    <p:ext uri="{521415D9-36F7-43E2-AB2F-B90AF26B5E84}">
+      <p14:sectionLst xmlns:p14="http://schemas.microsoft.com/office/powerpoint/2010/main">
+        <p14:section name="Default Section" id="{325CAFA5-0E80-4061-BFD0-8163F938C7F7}">
+          <p14:sldIdLst>
+            <p14:sldId id="256"/>
+            <p14:sldId id="257"/>
+            <p14:sldId id="258"/>
+            <p14:sldId id="264"/>
+            <p14:sldId id="265"/>
+          </p14:sldIdLst>
+        </p14:section>
+        <p14:section name="Untitled Section" id="{AF139091-FB60-43CC-9D0A-23A6773116D2}">
+          <p14:sldIdLst>
+            <p14:sldId id="263"/>
+            <p14:sldId id="267"/>
+            <p14:sldId id="266"/>
+            <p14:sldId id="268"/>
+          </p14:sldIdLst>
+        </p14:section>
+      </p14:sectionLst>
+    </p:ext>
     <p:ext uri="{EFAFB233-063F-42B5-8137-9DF3F51BA10A}">
       <p15:sldGuideLst xmlns:p15="http://schemas.microsoft.com/office/powerpoint/2012/main">
         <p15:guide id="1" orient="horz" pos="2160">
@@ -3495,7 +3516,7 @@
             <a:fld id="{3739F75B-3842-4986-B379-A25F65D2E2D9}" type="datetimeFigureOut">
               <a:rPr lang="en-US" smtClean="0"/>
               <a:pPr/>
-              <a:t>11/10/2014</a:t>
+              <a:t>11/11/2014</a:t>
             </a:fld>
             <a:endParaRPr lang="en-US"/>
           </a:p>
@@ -3646,7 +3667,7 @@
             <a:fld id="{866387FC-CCBE-45D6-8023-B2729909DF51}" type="datetimeFigureOut">
               <a:rPr lang="en-US" smtClean="0"/>
               <a:pPr/>
-              <a:t>11/10/2014</a:t>
+              <a:t>11/11/2014</a:t>
             </a:fld>
             <a:endParaRPr lang="en-US"/>
           </a:p>
@@ -3983,7 +4004,7 @@
             <a:fld id="{866387FC-CCBE-45D6-8023-B2729909DF51}" type="datetimeFigureOut">
               <a:rPr lang="en-US" smtClean="0"/>
               <a:pPr/>
-              <a:t>11/10/2014</a:t>
+              <a:t>11/11/2014</a:t>
             </a:fld>
             <a:endParaRPr lang="en-US"/>
           </a:p>
@@ -4137,7 +4158,7 @@
             <a:fld id="{866387FC-CCBE-45D6-8023-B2729909DF51}" type="datetimeFigureOut">
               <a:rPr lang="en-US" smtClean="0"/>
               <a:pPr/>
-              <a:t>11/10/2014</a:t>
+              <a:t>11/11/2014</a:t>
             </a:fld>
             <a:endParaRPr lang="en-US"/>
           </a:p>
@@ -4291,7 +4312,7 @@
             <a:fld id="{866387FC-CCBE-45D6-8023-B2729909DF51}" type="datetimeFigureOut">
               <a:rPr lang="en-US" smtClean="0"/>
               <a:pPr/>
-              <a:t>11/10/2014</a:t>
+              <a:t>11/11/2014</a:t>
             </a:fld>
             <a:endParaRPr lang="en-US"/>
           </a:p>
@@ -4445,7 +4466,7 @@
             <a:fld id="{866387FC-CCBE-45D6-8023-B2729909DF51}" type="datetimeFigureOut">
               <a:rPr lang="en-US" smtClean="0"/>
               <a:pPr/>
-              <a:t>11/10/2014</a:t>
+              <a:t>11/11/2014</a:t>
             </a:fld>
             <a:endParaRPr lang="en-US"/>
           </a:p>
@@ -4599,7 +4620,7 @@
             <a:fld id="{866387FC-CCBE-45D6-8023-B2729909DF51}" type="datetimeFigureOut">
               <a:rPr lang="en-US" smtClean="0"/>
               <a:pPr/>
-              <a:t>11/10/2014</a:t>
+              <a:t>11/11/2014</a:t>
             </a:fld>
             <a:endParaRPr lang="en-US"/>
           </a:p>
@@ -4753,7 +4774,7 @@
             <a:fld id="{866387FC-CCBE-45D6-8023-B2729909DF51}" type="datetimeFigureOut">
               <a:rPr lang="en-US" smtClean="0"/>
               <a:pPr/>
-              <a:t>11/10/2014</a:t>
+              <a:t>11/11/2014</a:t>
             </a:fld>
             <a:endParaRPr lang="en-US"/>
           </a:p>
@@ -4907,7 +4928,7 @@
             <a:fld id="{866387FC-CCBE-45D6-8023-B2729909DF51}" type="datetimeFigureOut">
               <a:rPr lang="en-US" smtClean="0"/>
               <a:pPr/>
-              <a:t>11/10/2014</a:t>
+              <a:t>11/11/2014</a:t>
             </a:fld>
             <a:endParaRPr lang="en-US"/>
           </a:p>
@@ -5061,7 +5082,7 @@
             <a:fld id="{866387FC-CCBE-45D6-8023-B2729909DF51}" type="datetimeFigureOut">
               <a:rPr lang="en-US" smtClean="0"/>
               <a:pPr/>
-              <a:t>11/10/2014</a:t>
+              <a:t>11/11/2014</a:t>
             </a:fld>
             <a:endParaRPr lang="en-US"/>
           </a:p>
@@ -5215,7 +5236,7 @@
             <a:fld id="{866387FC-CCBE-45D6-8023-B2729909DF51}" type="datetimeFigureOut">
               <a:rPr lang="en-US" smtClean="0"/>
               <a:pPr/>
-              <a:t>11/10/2014</a:t>
+              <a:t>11/11/2014</a:t>
             </a:fld>
             <a:endParaRPr lang="en-US"/>
           </a:p>
@@ -5673,7 +5694,7 @@
             <a:fld id="{633EFA78-DE0E-433D-8CFA-D9FBF0D95DCD}" type="datetime1">
               <a:rPr lang="en-US" smtClean="0"/>
               <a:pPr/>
-              <a:t>11/10/2014</a:t>
+              <a:t>11/11/2014</a:t>
             </a:fld>
             <a:endParaRPr lang="en-US"/>
           </a:p>
@@ -5850,7 +5871,7 @@
             <a:fld id="{4427F9C6-20A9-45D8-B666-D95AD1AA535F}" type="datetime1">
               <a:rPr lang="en-US" smtClean="0"/>
               <a:pPr/>
-              <a:t>11/10/2014</a:t>
+              <a:t>11/11/2014</a:t>
             </a:fld>
             <a:endParaRPr lang="en-US"/>
           </a:p>
@@ -5965,7 +5986,7 @@
             <a:fld id="{5AFB2161-9FCA-498A-A51E-7B90071250E8}" type="datetime1">
               <a:rPr lang="en-US" smtClean="0"/>
               <a:pPr/>
-              <a:t>11/10/2014</a:t>
+              <a:t>11/11/2014</a:t>
             </a:fld>
             <a:endParaRPr lang="en-US"/>
           </a:p>
@@ -6217,7 +6238,7 @@
             <a:fld id="{9F5395AF-258B-4502-92DF-E211AA281B41}" type="datetime1">
               <a:rPr lang="en-US" smtClean="0"/>
               <a:pPr/>
-              <a:t>11/10/2014</a:t>
+              <a:t>11/11/2014</a:t>
             </a:fld>
             <a:endParaRPr lang="en-US"/>
           </a:p>
@@ -6446,7 +6467,7 @@
             <a:fld id="{A1099F1B-DCEB-4336-9EB0-63F5002A04E3}" type="datetimeFigureOut">
               <a:rPr lang="en-US" smtClean="0"/>
               <a:pPr/>
-              <a:t>11/10/2014</a:t>
+              <a:t>11/11/2014</a:t>
             </a:fld>
             <a:endParaRPr lang="en-US"/>
           </a:p>
@@ -6613,7 +6634,7 @@
             <a:fld id="{A1099F1B-DCEB-4336-9EB0-63F5002A04E3}" type="datetimeFigureOut">
               <a:rPr lang="en-US" smtClean="0"/>
               <a:pPr/>
-              <a:t>11/10/2014</a:t>
+              <a:t>11/11/2014</a:t>
             </a:fld>
             <a:endParaRPr lang="en-US"/>
           </a:p>
@@ -6842,7 +6863,7 @@
             <a:fld id="{A1099F1B-DCEB-4336-9EB0-63F5002A04E3}" type="datetimeFigureOut">
               <a:rPr lang="en-US" smtClean="0"/>
               <a:pPr/>
-              <a:t>11/10/2014</a:t>
+              <a:t>11/11/2014</a:t>
             </a:fld>
             <a:endParaRPr lang="en-US"/>
           </a:p>
@@ -7283,7 +7304,7 @@
             <a:fld id="{1BC102A9-C1B1-4354-89E4-F43472216A4F}" type="datetime1">
               <a:rPr lang="en-US" smtClean="0"/>
               <a:pPr algn="r"/>
-              <a:t>11/10/2014</a:t>
+              <a:t>11/11/2014</a:t>
             </a:fld>
             <a:endParaRPr lang="en-US" sz="1000" dirty="0">
               <a:solidFill>
@@ -8713,25 +8734,144 @@
           </a:p>
         </p:txBody>
       </p:sp>
-      <p:sp>
-        <p:nvSpPr>
-          <p:cNvPr id="3" name="Content Placeholder 2"/>
-          <p:cNvSpPr>
-            <a:spLocks noGrp="1"/>
-          </p:cNvSpPr>
-          <p:nvPr>
-            <p:ph idx="1"/>
-          </p:nvPr>
-        </p:nvSpPr>
-        <p:spPr/>
-        <p:txBody>
-          <a:bodyPr/>
-          <a:lstStyle/>
-          <a:p>
-            <a:endParaRPr lang="en-US"/>
-          </a:p>
-        </p:txBody>
-      </p:sp>
+      <p:pic>
+        <p:nvPicPr>
+          <p:cNvPr id="4" name="Picture 3"/>
+          <p:cNvPicPr/>
+          <p:nvPr/>
+        </p:nvPicPr>
+        <p:blipFill>
+          <a:blip r:embed="rId3"/>
+          <a:stretch/>
+        </p:blipFill>
+        <p:spPr>
+          <a:xfrm>
+            <a:off x="923400" y="731520"/>
+            <a:ext cx="2642760" cy="1938600"/>
+          </a:xfrm>
+          <a:prstGeom prst="rect">
+            <a:avLst/>
+          </a:prstGeom>
+          <a:ln>
+            <a:noFill/>
+          </a:ln>
+        </p:spPr>
+      </p:pic>
+      <p:pic>
+        <p:nvPicPr>
+          <p:cNvPr id="5" name="Picture 4"/>
+          <p:cNvPicPr/>
+          <p:nvPr/>
+        </p:nvPicPr>
+        <p:blipFill>
+          <a:blip r:embed="rId4"/>
+          <a:stretch/>
+        </p:blipFill>
+        <p:spPr>
+          <a:xfrm>
+            <a:off x="3749040" y="987480"/>
+            <a:ext cx="1362600" cy="1024200"/>
+          </a:xfrm>
+          <a:prstGeom prst="rect">
+            <a:avLst/>
+          </a:prstGeom>
+          <a:ln>
+            <a:noFill/>
+          </a:ln>
+        </p:spPr>
+      </p:pic>
+      <p:pic>
+        <p:nvPicPr>
+          <p:cNvPr id="6" name="Picture 5"/>
+          <p:cNvPicPr/>
+          <p:nvPr/>
+        </p:nvPicPr>
+        <p:blipFill>
+          <a:blip r:embed="rId5"/>
+          <a:stretch/>
+        </p:blipFill>
+        <p:spPr>
+          <a:xfrm>
+            <a:off x="5312520" y="713160"/>
+            <a:ext cx="2642760" cy="1938600"/>
+          </a:xfrm>
+          <a:prstGeom prst="rect">
+            <a:avLst/>
+          </a:prstGeom>
+          <a:ln>
+            <a:noFill/>
+          </a:ln>
+        </p:spPr>
+      </p:pic>
+      <p:pic>
+        <p:nvPicPr>
+          <p:cNvPr id="7" name="Picture 6"/>
+          <p:cNvPicPr/>
+          <p:nvPr/>
+        </p:nvPicPr>
+        <p:blipFill>
+          <a:blip r:embed="rId6"/>
+          <a:stretch/>
+        </p:blipFill>
+        <p:spPr>
+          <a:xfrm>
+            <a:off x="704160" y="3291840"/>
+            <a:ext cx="3044880" cy="1581840"/>
+          </a:xfrm>
+          <a:prstGeom prst="rect">
+            <a:avLst/>
+          </a:prstGeom>
+          <a:ln>
+            <a:noFill/>
+          </a:ln>
+        </p:spPr>
+      </p:pic>
+      <p:pic>
+        <p:nvPicPr>
+          <p:cNvPr id="8" name="Picture 7"/>
+          <p:cNvPicPr/>
+          <p:nvPr/>
+        </p:nvPicPr>
+        <p:blipFill>
+          <a:blip r:embed="rId7"/>
+          <a:stretch/>
+        </p:blipFill>
+        <p:spPr>
+          <a:xfrm>
+            <a:off x="3996000" y="3840480"/>
+            <a:ext cx="1124640" cy="841320"/>
+          </a:xfrm>
+          <a:prstGeom prst="rect">
+            <a:avLst/>
+          </a:prstGeom>
+          <a:ln>
+            <a:noFill/>
+          </a:ln>
+        </p:spPr>
+      </p:pic>
+      <p:pic>
+        <p:nvPicPr>
+          <p:cNvPr id="9" name="Picture 8"/>
+          <p:cNvPicPr/>
+          <p:nvPr/>
+        </p:nvPicPr>
+        <p:blipFill>
+          <a:blip r:embed="rId8"/>
+          <a:stretch/>
+        </p:blipFill>
+        <p:spPr>
+          <a:xfrm>
+            <a:off x="5303520" y="3410640"/>
+            <a:ext cx="2541960" cy="2167200"/>
+          </a:xfrm>
+          <a:prstGeom prst="rect">
+            <a:avLst/>
+          </a:prstGeom>
+          <a:ln>
+            <a:noFill/>
+          </a:ln>
+        </p:spPr>
+      </p:pic>
     </p:spTree>
     <p:extLst>
       <p:ext uri="{BB962C8B-B14F-4D97-AF65-F5344CB8AC3E}">

</xml_diff>